<commit_message>
[Doc] (plan de test): Ajout du plan de test de la création de compte
</commit_message>
<xml_diff>
--- a/WIP/plan de test/planTestCreationDeCompte.pptx
+++ b/WIP/plan de test/planTestCreationDeCompte.pptx
@@ -376,7 +376,7 @@
           <a:p>
             <a:fld id="{1E206A72-DB16-4980-9BFD-3CFD1C680CE7}" type="datetimeFigureOut">
               <a:rPr lang="fr-FR" smtClean="0"/>
-              <a:t>18/11/2024</a:t>
+              <a:t>25/11/2024</a:t>
             </a:fld>
             <a:endParaRPr lang="fr-FR"/>
           </a:p>
@@ -574,7 +574,7 @@
           <a:p>
             <a:fld id="{1E206A72-DB16-4980-9BFD-3CFD1C680CE7}" type="datetimeFigureOut">
               <a:rPr lang="fr-FR" smtClean="0"/>
-              <a:t>18/11/2024</a:t>
+              <a:t>25/11/2024</a:t>
             </a:fld>
             <a:endParaRPr lang="fr-FR"/>
           </a:p>
@@ -782,7 +782,7 @@
           <a:p>
             <a:fld id="{1E206A72-DB16-4980-9BFD-3CFD1C680CE7}" type="datetimeFigureOut">
               <a:rPr lang="fr-FR" smtClean="0"/>
-              <a:t>18/11/2024</a:t>
+              <a:t>25/11/2024</a:t>
             </a:fld>
             <a:endParaRPr lang="fr-FR"/>
           </a:p>
@@ -980,7 +980,7 @@
           <a:p>
             <a:fld id="{1E206A72-DB16-4980-9BFD-3CFD1C680CE7}" type="datetimeFigureOut">
               <a:rPr lang="fr-FR" smtClean="0"/>
-              <a:t>18/11/2024</a:t>
+              <a:t>25/11/2024</a:t>
             </a:fld>
             <a:endParaRPr lang="fr-FR"/>
           </a:p>
@@ -1255,7 +1255,7 @@
           <a:p>
             <a:fld id="{1E206A72-DB16-4980-9BFD-3CFD1C680CE7}" type="datetimeFigureOut">
               <a:rPr lang="fr-FR" smtClean="0"/>
-              <a:t>18/11/2024</a:t>
+              <a:t>25/11/2024</a:t>
             </a:fld>
             <a:endParaRPr lang="fr-FR"/>
           </a:p>
@@ -1520,7 +1520,7 @@
           <a:p>
             <a:fld id="{1E206A72-DB16-4980-9BFD-3CFD1C680CE7}" type="datetimeFigureOut">
               <a:rPr lang="fr-FR" smtClean="0"/>
-              <a:t>18/11/2024</a:t>
+              <a:t>25/11/2024</a:t>
             </a:fld>
             <a:endParaRPr lang="fr-FR"/>
           </a:p>
@@ -1932,7 +1932,7 @@
           <a:p>
             <a:fld id="{1E206A72-DB16-4980-9BFD-3CFD1C680CE7}" type="datetimeFigureOut">
               <a:rPr lang="fr-FR" smtClean="0"/>
-              <a:t>18/11/2024</a:t>
+              <a:t>25/11/2024</a:t>
             </a:fld>
             <a:endParaRPr lang="fr-FR"/>
           </a:p>
@@ -2073,7 +2073,7 @@
           <a:p>
             <a:fld id="{1E206A72-DB16-4980-9BFD-3CFD1C680CE7}" type="datetimeFigureOut">
               <a:rPr lang="fr-FR" smtClean="0"/>
-              <a:t>18/11/2024</a:t>
+              <a:t>25/11/2024</a:t>
             </a:fld>
             <a:endParaRPr lang="fr-FR"/>
           </a:p>
@@ -2186,7 +2186,7 @@
           <a:p>
             <a:fld id="{1E206A72-DB16-4980-9BFD-3CFD1C680CE7}" type="datetimeFigureOut">
               <a:rPr lang="fr-FR" smtClean="0"/>
-              <a:t>18/11/2024</a:t>
+              <a:t>25/11/2024</a:t>
             </a:fld>
             <a:endParaRPr lang="fr-FR"/>
           </a:p>
@@ -2497,7 +2497,7 @@
           <a:p>
             <a:fld id="{1E206A72-DB16-4980-9BFD-3CFD1C680CE7}" type="datetimeFigureOut">
               <a:rPr lang="fr-FR" smtClean="0"/>
-              <a:t>18/11/2024</a:t>
+              <a:t>25/11/2024</a:t>
             </a:fld>
             <a:endParaRPr lang="fr-FR"/>
           </a:p>
@@ -2785,7 +2785,7 @@
           <a:p>
             <a:fld id="{1E206A72-DB16-4980-9BFD-3CFD1C680CE7}" type="datetimeFigureOut">
               <a:rPr lang="fr-FR" smtClean="0"/>
-              <a:t>18/11/2024</a:t>
+              <a:t>25/11/2024</a:t>
             </a:fld>
             <a:endParaRPr lang="fr-FR"/>
           </a:p>
@@ -3026,7 +3026,7 @@
           <a:p>
             <a:fld id="{1E206A72-DB16-4980-9BFD-3CFD1C680CE7}" type="datetimeFigureOut">
               <a:rPr lang="fr-FR" smtClean="0"/>
-              <a:t>18/11/2024</a:t>
+              <a:t>25/11/2024</a:t>
             </a:fld>
             <a:endParaRPr lang="fr-FR"/>
           </a:p>
@@ -3657,7 +3657,7 @@
               </a:pPr>
               <a:r>
                 <a:rPr lang="fr-FR" sz="1400" dirty="0"/>
-                <a:t>Domaine fonctionnel : Création de compte</a:t>
+                <a:t>Domaine fonctionnel : Saisie des données de la création de compte.</a:t>
               </a:r>
             </a:p>
             <a:p>
@@ -3679,7 +3679,7 @@
               </a:r>
               <a:r>
                 <a:rPr lang="fr-FR" sz="1400" dirty="0"/>
-                <a:t>du plan de test : Ce plan de test permet de vérifier la création d’un compte</a:t>
+                <a:t>du plan de test : Ce plan de test permet de vérifier la création d’un compte.</a:t>
               </a:r>
             </a:p>
           </p:txBody>
@@ -3849,21 +3849,6 @@
               </a:r>
             </a:p>
             <a:p>
-              <a:pPr marL="0" lvl="0" indent="0" defTabSz="2400300">
-                <a:lnSpc>
-                  <a:spcPct val="90000"/>
-                </a:lnSpc>
-                <a:spcBef>
-                  <a:spcPct val="0"/>
-                </a:spcBef>
-                <a:spcAft>
-                  <a:spcPct val="35000"/>
-                </a:spcAft>
-                <a:buNone/>
-              </a:pPr>
-              <a:endParaRPr lang="fr-FR" sz="1400" b="1" u="sng" kern="1200" dirty="0"/>
-            </a:p>
-            <a:p>
               <a:pPr defTabSz="2400300">
                 <a:lnSpc>
                   <a:spcPct val="90000"/>
@@ -3883,6 +3868,86 @@
                 <a:rPr lang="fr-FR" sz="1200" dirty="0"/>
                 <a:t>.</a:t>
               </a:r>
+            </a:p>
+            <a:p>
+              <a:pPr defTabSz="2400300">
+                <a:lnSpc>
+                  <a:spcPct val="90000"/>
+                </a:lnSpc>
+                <a:spcBef>
+                  <a:spcPct val="0"/>
+                </a:spcBef>
+                <a:spcAft>
+                  <a:spcPct val="35000"/>
+                </a:spcAft>
+              </a:pPr>
+              <a:r>
+                <a:rPr lang="fr-FR" sz="1200" dirty="0"/>
+                <a:t>Test de mot de passe limite.</a:t>
+              </a:r>
+            </a:p>
+            <a:p>
+              <a:pPr defTabSz="2400300">
+                <a:lnSpc>
+                  <a:spcPct val="90000"/>
+                </a:lnSpc>
+                <a:spcBef>
+                  <a:spcPct val="0"/>
+                </a:spcBef>
+                <a:spcAft>
+                  <a:spcPct val="35000"/>
+                </a:spcAft>
+              </a:pPr>
+              <a:r>
+                <a:rPr lang="fr-FR" sz="1200" dirty="0"/>
+                <a:t>Test de l’ajout </a:t>
+              </a:r>
+              <a:r>
+                <a:rPr lang="fr-FR" sz="1200"/>
+                <a:t>du compte</a:t>
+              </a:r>
+              <a:endParaRPr lang="fr-FR" sz="1200" dirty="0"/>
+            </a:p>
+            <a:p>
+              <a:pPr defTabSz="2400300">
+                <a:lnSpc>
+                  <a:spcPct val="90000"/>
+                </a:lnSpc>
+                <a:spcBef>
+                  <a:spcPct val="0"/>
+                </a:spcBef>
+                <a:spcAft>
+                  <a:spcPct val="35000"/>
+                </a:spcAft>
+              </a:pPr>
+              <a:endParaRPr lang="fr-FR" sz="1200" dirty="0"/>
+            </a:p>
+            <a:p>
+              <a:pPr defTabSz="2400300">
+                <a:lnSpc>
+                  <a:spcPct val="90000"/>
+                </a:lnSpc>
+                <a:spcBef>
+                  <a:spcPct val="0"/>
+                </a:spcBef>
+                <a:spcAft>
+                  <a:spcPct val="35000"/>
+                </a:spcAft>
+              </a:pPr>
+              <a:endParaRPr lang="fr-FR" sz="1200" dirty="0"/>
+            </a:p>
+            <a:p>
+              <a:pPr defTabSz="2400300">
+                <a:lnSpc>
+                  <a:spcPct val="90000"/>
+                </a:lnSpc>
+                <a:spcBef>
+                  <a:spcPct val="0"/>
+                </a:spcBef>
+                <a:spcAft>
+                  <a:spcPct val="35000"/>
+                </a:spcAft>
+              </a:pPr>
               <a:r>
                 <a:rPr lang="fr-FR" sz="1200" kern="1200" dirty="0"/>
                 <a:t>	</a:t>
@@ -4070,7 +4135,7 @@
               </a:pPr>
               <a:r>
                 <a:rPr lang="fr-FR" sz="1400" dirty="0"/>
-                <a:t>Local</a:t>
+                <a:t>Local, intégration</a:t>
               </a:r>
               <a:endParaRPr lang="fr-FR" sz="1400" kern="1200" dirty="0"/>
             </a:p>
@@ -4237,7 +4302,7 @@
               </a:pPr>
               <a:r>
                 <a:rPr lang="fr-FR" sz="1400" b="1" u="sng" kern="1200" dirty="0"/>
-                <a:t>Données de test</a:t>
+                <a:t>Données de test:</a:t>
               </a:r>
             </a:p>
             <a:p>
@@ -4254,10 +4319,57 @@
                 <a:buNone/>
               </a:pPr>
               <a:r>
-                <a:rPr lang="fr-FR" sz="1400" b="1" u="sng"/>
-                <a:t>Fausse Email</a:t>
+                <a:rPr lang="fr-FR" sz="1400" dirty="0"/>
+                <a:t>- Emails aléatoire</a:t>
               </a:r>
-              <a:endParaRPr lang="fr-FR" sz="1400" b="1" u="sng" kern="1200" dirty="0"/>
+            </a:p>
+            <a:p>
+              <a:pPr marL="0" lvl="0" indent="0" defTabSz="1333500">
+                <a:lnSpc>
+                  <a:spcPct val="90000"/>
+                </a:lnSpc>
+                <a:spcBef>
+                  <a:spcPct val="0"/>
+                </a:spcBef>
+                <a:spcAft>
+                  <a:spcPct val="35000"/>
+                </a:spcAft>
+                <a:buNone/>
+              </a:pPr>
+              <a:r>
+                <a:rPr lang="fr-FR" sz="1400" dirty="0"/>
+                <a:t>- Faux mot de passe</a:t>
+              </a:r>
+            </a:p>
+            <a:p>
+              <a:pPr marL="0" lvl="0" indent="0" defTabSz="1333500">
+                <a:lnSpc>
+                  <a:spcPct val="90000"/>
+                </a:lnSpc>
+                <a:spcBef>
+                  <a:spcPct val="0"/>
+                </a:spcBef>
+                <a:spcAft>
+                  <a:spcPct val="35000"/>
+                </a:spcAft>
+                <a:buNone/>
+              </a:pPr>
+              <a:endParaRPr lang="fr-FR" sz="1400" dirty="0"/>
+            </a:p>
+            <a:p>
+              <a:pPr marL="0" lvl="0" indent="0" defTabSz="1333500">
+                <a:lnSpc>
+                  <a:spcPct val="90000"/>
+                </a:lnSpc>
+                <a:spcBef>
+                  <a:spcPct val="0"/>
+                </a:spcBef>
+                <a:spcAft>
+                  <a:spcPct val="35000"/>
+                </a:spcAft>
+                <a:buNone/>
+              </a:pPr>
+              <a:endParaRPr lang="fr-FR" sz="1400" kern="1200" dirty="0"/>
             </a:p>
           </p:txBody>
         </p:sp>
@@ -4426,7 +4538,7 @@
               </a:r>
             </a:p>
             <a:p>
-              <a:pPr marL="0" lvl="0" indent="0" defTabSz="2400300">
+              <a:pPr defTabSz="2400300">
                 <a:lnSpc>
                   <a:spcPct val="90000"/>
                 </a:lnSpc>
@@ -4436,7 +4548,6 @@
                 <a:spcAft>
                   <a:spcPct val="35000"/>
                 </a:spcAft>
-                <a:buNone/>
               </a:pPr>
               <a:endParaRPr lang="fr-FR" sz="1400" b="1" u="sng" dirty="0"/>
             </a:p>
@@ -4453,25 +4564,8 @@
                 </a:spcAft>
               </a:pPr>
               <a:r>
-                <a:rPr lang="fr-FR" sz="1400" kern="1200" dirty="0"/>
-                <a:t>Exports (tous)</a:t>
-              </a:r>
-            </a:p>
-            <a:p>
-              <a:pPr defTabSz="2400300">
-                <a:lnSpc>
-                  <a:spcPct val="90000"/>
-                </a:lnSpc>
-                <a:spcBef>
-                  <a:spcPct val="0"/>
-                </a:spcBef>
-                <a:spcAft>
-                  <a:spcPct val="35000"/>
-                </a:spcAft>
-              </a:pPr>
-              <a:r>
                 <a:rPr lang="fr-FR" sz="1400" dirty="0"/>
-                <a:t>Saisies en masse de données, les tests ne seront effectués que sur les saisies simples via les formulaires</a:t>
+                <a:t>Saisies de caractère spéciaux type:  «*#%|</a:t>
               </a:r>
               <a:endParaRPr lang="fr-FR" sz="1400" kern="1200" dirty="0"/>
             </a:p>
@@ -4682,29 +4776,7 @@
                     <a:schemeClr val="tx1"/>
                   </a:solidFill>
                 </a:rPr>
-                <a:t>!! Ne pas passer les API en configuration de production</a:t>
-              </a:r>
-            </a:p>
-            <a:p>
-              <a:pPr marL="0" lvl="0" indent="0" defTabSz="1333500">
-                <a:lnSpc>
-                  <a:spcPct val="90000"/>
-                </a:lnSpc>
-                <a:spcBef>
-                  <a:spcPct val="0"/>
-                </a:spcBef>
-                <a:spcAft>
-                  <a:spcPct val="35000"/>
-                </a:spcAft>
-                <a:buNone/>
-              </a:pPr>
-              <a:r>
-                <a:rPr lang="fr-FR" sz="1400" dirty="0">
-                  <a:solidFill>
-                    <a:schemeClr val="tx1"/>
-                  </a:solidFill>
-                </a:rPr>
-                <a:t>Jeu de données réduit et anonymisé, donc écart avec la réalité</a:t>
+                <a:t>Ne pas supprimé les comptes créer</a:t>
               </a:r>
             </a:p>
           </p:txBody>
@@ -4887,7 +4959,7 @@
               </a:pPr>
               <a:r>
                 <a:rPr lang="fr-FR" sz="1400" dirty="0"/>
-                <a:t>Tests à réaliser dès la mise à disposition de l’artefact par les équipes de développement</a:t>
+                <a:t>Tests à réaliser dès la fin des différents plans de test</a:t>
               </a:r>
             </a:p>
             <a:p>
@@ -5264,26 +5336,6 @@
 </file>
 
 <file path=customXml/item1.xml><?xml version="1.0" encoding="utf-8"?>
-<?mso-contentType ?>
-<FormTemplates xmlns="http://schemas.microsoft.com/sharepoint/v3/contenttype/forms">
-  <Display>DocumentLibraryForm</Display>
-  <Edit>DocumentLibraryForm</Edit>
-  <New>DocumentLibraryForm</New>
-</FormTemplates>
-</file>
-
-<file path=customXml/item2.xml><?xml version="1.0" encoding="utf-8"?>
-<p:properties xmlns:p="http://schemas.microsoft.com/office/2006/metadata/properties" xmlns:xsi="http://www.w3.org/2001/XMLSchema-instance" xmlns:pc="http://schemas.microsoft.com/office/infopath/2007/PartnerControls">
-  <documentManagement>
-    <lcf76f155ced4ddcb4097134ff3c332f xmlns="b5cf4370-ac38-4b9e-9836-ef6f5df64f24">
-      <Terms xmlns="http://schemas.microsoft.com/office/infopath/2007/PartnerControls"/>
-    </lcf76f155ced4ddcb4097134ff3c332f>
-    <TaxCatchAll xmlns="eefa3612-053e-497a-ae76-8a76877f5e22" xsi:nil="true"/>
-  </documentManagement>
-</p:properties>
-</file>
-
-<file path=customXml/item3.xml><?xml version="1.0" encoding="utf-8"?>
 <ct:contentTypeSchema xmlns:ct="http://schemas.microsoft.com/office/2006/metadata/contentType" xmlns:ma="http://schemas.microsoft.com/office/2006/metadata/properties/metaAttributes" ct:_="" ma:_="" ma:contentTypeName="Document" ma:contentTypeID="0x01010080C9F2488912074FB587B9AD9ADAE5BB" ma:contentTypeVersion="11" ma:contentTypeDescription="Crée un document." ma:contentTypeScope="" ma:versionID="1bebaa2d391e7c30de2dcb588a772684">
   <xsd:schema xmlns:xsd="http://www.w3.org/2001/XMLSchema" xmlns:xs="http://www.w3.org/2001/XMLSchema" xmlns:p="http://schemas.microsoft.com/office/2006/metadata/properties" xmlns:ns2="b5cf4370-ac38-4b9e-9836-ef6f5df64f24" xmlns:ns3="eefa3612-053e-497a-ae76-8a76877f5e22" targetNamespace="http://schemas.microsoft.com/office/2006/metadata/properties" ma:root="true" ma:fieldsID="071e4af5f84e298b60331b8e79120627" ns2:_="" ns3:_="">
     <xsd:import namespace="b5cf4370-ac38-4b9e-9836-ef6f5df64f24"/>
@@ -5478,10 +5530,41 @@
 </ct:contentTypeSchema>
 </file>
 
+<file path=customXml/item2.xml><?xml version="1.0" encoding="utf-8"?>
+<p:properties xmlns:p="http://schemas.microsoft.com/office/2006/metadata/properties" xmlns:xsi="http://www.w3.org/2001/XMLSchema-instance" xmlns:pc="http://schemas.microsoft.com/office/infopath/2007/PartnerControls">
+  <documentManagement>
+    <lcf76f155ced4ddcb4097134ff3c332f xmlns="b5cf4370-ac38-4b9e-9836-ef6f5df64f24">
+      <Terms xmlns="http://schemas.microsoft.com/office/infopath/2007/PartnerControls"/>
+    </lcf76f155ced4ddcb4097134ff3c332f>
+    <TaxCatchAll xmlns="eefa3612-053e-497a-ae76-8a76877f5e22" xsi:nil="true"/>
+  </documentManagement>
+</p:properties>
+</file>
+
+<file path=customXml/item3.xml><?xml version="1.0" encoding="utf-8"?>
+<?mso-contentType ?>
+<FormTemplates xmlns="http://schemas.microsoft.com/sharepoint/v3/contenttype/forms">
+  <Display>DocumentLibraryForm</Display>
+  <Edit>DocumentLibraryForm</Edit>
+  <New>DocumentLibraryForm</New>
+</FormTemplates>
+</file>
+
 <file path=customXml/itemProps1.xml><?xml version="1.0" encoding="utf-8"?>
-<ds:datastoreItem xmlns:ds="http://schemas.openxmlformats.org/officeDocument/2006/customXml" ds:itemID="{64DB6A9B-4014-4350-8FE6-F72DA25DFBDF}">
+<ds:datastoreItem xmlns:ds="http://schemas.openxmlformats.org/officeDocument/2006/customXml" ds:itemID="{C2099935-ADE8-4E25-82AD-270299869B08}">
   <ds:schemaRefs>
-    <ds:schemaRef ds:uri="http://schemas.microsoft.com/sharepoint/v3/contenttype/forms"/>
+    <ds:schemaRef ds:uri="http://schemas.microsoft.com/office/2006/metadata/contentType"/>
+    <ds:schemaRef ds:uri="http://schemas.microsoft.com/office/2006/metadata/properties/metaAttributes"/>
+    <ds:schemaRef ds:uri="http://www.w3.org/2001/XMLSchema"/>
+    <ds:schemaRef ds:uri="http://schemas.microsoft.com/office/2006/metadata/properties"/>
+    <ds:schemaRef ds:uri="b5cf4370-ac38-4b9e-9836-ef6f5df64f24"/>
+    <ds:schemaRef ds:uri="eefa3612-053e-497a-ae76-8a76877f5e22"/>
+    <ds:schemaRef ds:uri="http://schemas.microsoft.com/office/2006/documentManagement/types"/>
+    <ds:schemaRef ds:uri="http://schemas.microsoft.com/office/infopath/2007/PartnerControls"/>
+    <ds:schemaRef ds:uri="http://schemas.openxmlformats.org/package/2006/metadata/core-properties"/>
+    <ds:schemaRef ds:uri="http://purl.org/dc/elements/1.1/"/>
+    <ds:schemaRef ds:uri="http://purl.org/dc/terms/"/>
+    <ds:schemaRef ds:uri="http://schemas.microsoft.com/internal/obd"/>
   </ds:schemaRefs>
 </ds:datastoreItem>
 </file>
@@ -5498,20 +5581,9 @@
 </file>
 
 <file path=customXml/itemProps3.xml><?xml version="1.0" encoding="utf-8"?>
-<ds:datastoreItem xmlns:ds="http://schemas.openxmlformats.org/officeDocument/2006/customXml" ds:itemID="{C2099935-ADE8-4E25-82AD-270299869B08}">
+<ds:datastoreItem xmlns:ds="http://schemas.openxmlformats.org/officeDocument/2006/customXml" ds:itemID="{64DB6A9B-4014-4350-8FE6-F72DA25DFBDF}">
   <ds:schemaRefs>
-    <ds:schemaRef ds:uri="http://schemas.microsoft.com/office/2006/metadata/contentType"/>
-    <ds:schemaRef ds:uri="http://schemas.microsoft.com/office/2006/metadata/properties/metaAttributes"/>
-    <ds:schemaRef ds:uri="http://www.w3.org/2001/XMLSchema"/>
-    <ds:schemaRef ds:uri="http://schemas.microsoft.com/office/2006/metadata/properties"/>
-    <ds:schemaRef ds:uri="b5cf4370-ac38-4b9e-9836-ef6f5df64f24"/>
-    <ds:schemaRef ds:uri="eefa3612-053e-497a-ae76-8a76877f5e22"/>
-    <ds:schemaRef ds:uri="http://schemas.microsoft.com/office/2006/documentManagement/types"/>
-    <ds:schemaRef ds:uri="http://schemas.microsoft.com/office/infopath/2007/PartnerControls"/>
-    <ds:schemaRef ds:uri="http://schemas.openxmlformats.org/package/2006/metadata/core-properties"/>
-    <ds:schemaRef ds:uri="http://purl.org/dc/elements/1.1/"/>
-    <ds:schemaRef ds:uri="http://purl.org/dc/terms/"/>
-    <ds:schemaRef ds:uri="http://schemas.microsoft.com/internal/obd"/>
+    <ds:schemaRef ds:uri="http://schemas.microsoft.com/sharepoint/v3/contenttype/forms"/>
   </ds:schemaRefs>
 </ds:datastoreItem>
 </file>
</xml_diff>